<commit_message>
Enhance report and README
</commit_message>
<xml_diff>
--- a/report/Marketing_Analytics_Report.pptx
+++ b/report/Marketing_Analytics_Report.pptx
@@ -4729,6 +4729,7 @@
       <p:pic>
         <p:nvPicPr>
           <p:cNvPr id="5" name="Picture 4">
+            <a:hlinkClick r:id="rId2" tooltip="Github"/>
             <a:extLst>
               <a:ext uri="{FF2B5EF4-FFF2-40B4-BE49-F238E27FC236}">
                 <a16:creationId xmlns:a16="http://schemas.microsoft.com/office/drawing/2014/main" id="{AEE90DD7-62FF-469A-B7DB-FC999CF7317B}"/>
@@ -4741,7 +4742,7 @@
           <p:nvPr/>
         </p:nvPicPr>
         <p:blipFill>
-          <a:blip r:embed="rId2">
+          <a:blip r:embed="rId3">
             <a:extLst>
               <a:ext uri="{28A0092B-C50C-407E-A947-70E740481C1C}">
                 <a14:useLocalDpi xmlns:a14="http://schemas.microsoft.com/office/drawing/2010/main" val="0"/>
@@ -4754,7 +4755,7 @@
         </p:blipFill>
         <p:spPr>
           <a:xfrm>
-            <a:off x="7159600" y="2030351"/>
+            <a:off x="1690134" y="1924082"/>
             <a:ext cx="1193651" cy="1193651"/>
           </a:xfrm>
           <a:prstGeom prst="rect">
@@ -4765,6 +4766,7 @@
       <p:pic>
         <p:nvPicPr>
           <p:cNvPr id="11" name="Picture 10">
+            <a:hlinkClick r:id="rId4"/>
             <a:extLst>
               <a:ext uri="{FF2B5EF4-FFF2-40B4-BE49-F238E27FC236}">
                 <a16:creationId xmlns:a16="http://schemas.microsoft.com/office/drawing/2014/main" id="{6D1ECF51-4E87-47AB-95D4-3E5EE83ADACF}"/>
@@ -4777,7 +4779,7 @@
           <p:nvPr/>
         </p:nvPicPr>
         <p:blipFill>
-          <a:blip r:embed="rId3">
+          <a:blip r:embed="rId5">
             <a:extLst>
               <a:ext uri="{28A0092B-C50C-407E-A947-70E740481C1C}">
                 <a14:useLocalDpi xmlns:a14="http://schemas.microsoft.com/office/drawing/2010/main" val="0"/>
@@ -4798,57 +4800,21 @@
           </a:prstGeom>
         </p:spPr>
       </p:pic>
-      <p:pic>
-        <p:nvPicPr>
-          <p:cNvPr id="13" name="Picture 12">
-            <a:extLst>
-              <a:ext uri="{FF2B5EF4-FFF2-40B4-BE49-F238E27FC236}">
-                <a16:creationId xmlns:a16="http://schemas.microsoft.com/office/drawing/2014/main" id="{310F43AA-9124-4BCC-9786-9A2080C63E3C}"/>
-              </a:ext>
-            </a:extLst>
-          </p:cNvPr>
-          <p:cNvPicPr>
-            <a:picLocks noChangeAspect="1"/>
-          </p:cNvPicPr>
+      <p:sp>
+        <p:nvSpPr>
+          <p:cNvPr id="15" name="TextBox 14">
+            <a:extLst>
+              <a:ext uri="{FF2B5EF4-FFF2-40B4-BE49-F238E27FC236}">
+                <a16:creationId xmlns:a16="http://schemas.microsoft.com/office/drawing/2014/main" id="{25F71A56-56B6-4FF2-ABC2-9875BA67F755}"/>
+              </a:ext>
+            </a:extLst>
+          </p:cNvPr>
+          <p:cNvSpPr txBox="1"/>
           <p:nvPr/>
-        </p:nvPicPr>
-        <p:blipFill>
-          <a:blip r:embed="rId4">
-            <a:extLst>
-              <a:ext uri="{28A0092B-C50C-407E-A947-70E740481C1C}">
-                <a14:useLocalDpi xmlns:a14="http://schemas.microsoft.com/office/drawing/2010/main" val="0"/>
-              </a:ext>
-            </a:extLst>
-          </a:blip>
-          <a:stretch>
-            <a:fillRect/>
-          </a:stretch>
-        </p:blipFill>
+        </p:nvSpPr>
         <p:spPr>
           <a:xfrm>
-            <a:off x="1405466" y="2106551"/>
-            <a:ext cx="858510" cy="858510"/>
-          </a:xfrm>
-          <a:prstGeom prst="rect">
-            <a:avLst/>
-          </a:prstGeom>
-        </p:spPr>
-      </p:pic>
-      <p:sp>
-        <p:nvSpPr>
-          <p:cNvPr id="14" name="TextBox 13">
-            <a:extLst>
-              <a:ext uri="{FF2B5EF4-FFF2-40B4-BE49-F238E27FC236}">
-                <a16:creationId xmlns:a16="http://schemas.microsoft.com/office/drawing/2014/main" id="{995DC79A-4BA5-482D-AC54-4F004CFCC85E}"/>
-              </a:ext>
-            </a:extLst>
-          </p:cNvPr>
-          <p:cNvSpPr txBox="1"/>
-          <p:nvPr/>
-        </p:nvSpPr>
-        <p:spPr>
-          <a:xfrm>
-            <a:off x="728133" y="3380922"/>
+            <a:off x="3357121" y="3429000"/>
             <a:ext cx="2709333" cy="369332"/>
           </a:xfrm>
           <a:prstGeom prst="rect">
@@ -4862,19 +4828,24 @@
           </a:bodyPr>
           <a:lstStyle/>
           <a:p>
-            <a:r>
-              <a:rPr lang="en-US" b="1" dirty="0"/>
-              <a:t>Power BI Dashboard</a:t>
-            </a:r>
-          </a:p>
-        </p:txBody>
-      </p:sp>
-      <p:sp>
-        <p:nvSpPr>
-          <p:cNvPr id="15" name="TextBox 14">
-            <a:extLst>
-              <a:ext uri="{FF2B5EF4-FFF2-40B4-BE49-F238E27FC236}">
-                <a16:creationId xmlns:a16="http://schemas.microsoft.com/office/drawing/2014/main" id="{25F71A56-56B6-4FF2-ABC2-9875BA67F755}"/>
+            <a:pPr algn="ctr"/>
+            <a:r>
+              <a:rPr lang="en-US" b="1" dirty="0">
+                <a:hlinkClick r:id="rId4"/>
+              </a:rPr>
+              <a:t>Portfolio Website</a:t>
+            </a:r>
+            <a:endParaRPr lang="en-US" dirty="0"/>
+          </a:p>
+        </p:txBody>
+      </p:sp>
+      <p:sp>
+        <p:nvSpPr>
+          <p:cNvPr id="16" name="TextBox 15">
+            <a:hlinkClick r:id="rId2"/>
+            <a:extLst>
+              <a:ext uri="{FF2B5EF4-FFF2-40B4-BE49-F238E27FC236}">
+                <a16:creationId xmlns:a16="http://schemas.microsoft.com/office/drawing/2014/main" id="{7AE50E6C-3C3A-4A07-B412-A0D3CEFFBF1C}"/>
               </a:ext>
             </a:extLst>
           </p:cNvPr>
@@ -4883,43 +4854,7 @@
         </p:nvSpPr>
         <p:spPr>
           <a:xfrm>
-            <a:off x="3763361" y="3429000"/>
-            <a:ext cx="2709333" cy="369332"/>
-          </a:xfrm>
-          <a:prstGeom prst="rect">
-            <a:avLst/>
-          </a:prstGeom>
-          <a:noFill/>
-        </p:spPr>
-        <p:txBody>
-          <a:bodyPr wrap="square" rtlCol="0">
-            <a:spAutoFit/>
-          </a:bodyPr>
-          <a:lstStyle/>
-          <a:p>
-            <a:r>
-              <a:rPr lang="en-US" b="1" dirty="0"/>
-              <a:t>Portfolio Website</a:t>
-            </a:r>
-            <a:endParaRPr lang="en-US" dirty="0"/>
-          </a:p>
-        </p:txBody>
-      </p:sp>
-      <p:sp>
-        <p:nvSpPr>
-          <p:cNvPr id="16" name="TextBox 15">
-            <a:extLst>
-              <a:ext uri="{FF2B5EF4-FFF2-40B4-BE49-F238E27FC236}">
-                <a16:creationId xmlns:a16="http://schemas.microsoft.com/office/drawing/2014/main" id="{7AE50E6C-3C3A-4A07-B412-A0D3CEFFBF1C}"/>
-              </a:ext>
-            </a:extLst>
-          </p:cNvPr>
-          <p:cNvSpPr txBox="1"/>
-          <p:nvPr/>
-        </p:nvSpPr>
-        <p:spPr>
-          <a:xfrm>
-            <a:off x="6701520" y="3449333"/>
+            <a:off x="954751" y="3396336"/>
             <a:ext cx="2649953" cy="369332"/>
           </a:xfrm>
           <a:prstGeom prst="rect">
@@ -4933,6 +4868,7 @@
           </a:bodyPr>
           <a:lstStyle/>
           <a:p>
+            <a:pPr algn="ctr"/>
             <a:r>
               <a:rPr lang="en-US" sz="1800" b="1" kern="1200" dirty="0">
                 <a:solidFill>
@@ -4942,10 +4878,163 @@
                 <a:latin typeface="Calibri" panose="020F0502020204030204" pitchFamily="34" charset="0"/>
                 <a:ea typeface="+mn-ea"/>
                 <a:cs typeface="+mn-cs"/>
+                <a:hlinkClick r:id="rId2" tooltip="Github"/>
               </a:rPr>
               <a:t>GitHub Repository</a:t>
             </a:r>
             <a:endParaRPr lang="en-US" dirty="0"/>
+          </a:p>
+        </p:txBody>
+      </p:sp>
+      <p:pic>
+        <p:nvPicPr>
+          <p:cNvPr id="4" name="Picture 3">
+            <a:hlinkClick r:id="rId6" tooltip="Contact Me"/>
+            <a:extLst>
+              <a:ext uri="{FF2B5EF4-FFF2-40B4-BE49-F238E27FC236}">
+                <a16:creationId xmlns:a16="http://schemas.microsoft.com/office/drawing/2014/main" id="{8F761DB5-B16F-47B1-BBDA-4A429EEFE99B}"/>
+              </a:ext>
+            </a:extLst>
+          </p:cNvPr>
+          <p:cNvPicPr>
+            <a:picLocks noChangeAspect="1"/>
+          </p:cNvPicPr>
+          <p:nvPr/>
+        </p:nvPicPr>
+        <p:blipFill>
+          <a:blip r:embed="rId7">
+            <a:extLst>
+              <a:ext uri="{28A0092B-C50C-407E-A947-70E740481C1C}">
+                <a14:useLocalDpi xmlns:a14="http://schemas.microsoft.com/office/drawing/2010/main" val="0"/>
+              </a:ext>
+            </a:extLst>
+          </a:blip>
+          <a:stretch>
+            <a:fillRect/>
+          </a:stretch>
+        </p:blipFill>
+        <p:spPr>
+          <a:xfrm>
+            <a:off x="8731372" y="1955884"/>
+            <a:ext cx="1271333" cy="1271333"/>
+          </a:xfrm>
+          <a:prstGeom prst="rect">
+            <a:avLst/>
+          </a:prstGeom>
+        </p:spPr>
+      </p:pic>
+      <p:pic>
+        <p:nvPicPr>
+          <p:cNvPr id="7" name="Picture 6">
+            <a:hlinkClick r:id="rId8"/>
+            <a:extLst>
+              <a:ext uri="{FF2B5EF4-FFF2-40B4-BE49-F238E27FC236}">
+                <a16:creationId xmlns:a16="http://schemas.microsoft.com/office/drawing/2014/main" id="{9E7942C9-152C-433F-9DFC-C244C6CD732E}"/>
+              </a:ext>
+            </a:extLst>
+          </p:cNvPr>
+          <p:cNvPicPr>
+            <a:picLocks noChangeAspect="1"/>
+          </p:cNvPicPr>
+          <p:nvPr/>
+        </p:nvPicPr>
+        <p:blipFill>
+          <a:blip r:embed="rId9">
+            <a:extLst>
+              <a:ext uri="{28A0092B-C50C-407E-A947-70E740481C1C}">
+                <a14:useLocalDpi xmlns:a14="http://schemas.microsoft.com/office/drawing/2010/main" val="0"/>
+              </a:ext>
+            </a:extLst>
+          </a:blip>
+          <a:stretch>
+            <a:fillRect/>
+          </a:stretch>
+        </p:blipFill>
+        <p:spPr>
+          <a:xfrm>
+            <a:off x="6382756" y="2040037"/>
+            <a:ext cx="1103026" cy="1103026"/>
+          </a:xfrm>
+          <a:prstGeom prst="rect">
+            <a:avLst/>
+          </a:prstGeom>
+        </p:spPr>
+      </p:pic>
+      <p:sp>
+        <p:nvSpPr>
+          <p:cNvPr id="8" name="TextBox 7">
+            <a:extLst>
+              <a:ext uri="{FF2B5EF4-FFF2-40B4-BE49-F238E27FC236}">
+                <a16:creationId xmlns:a16="http://schemas.microsoft.com/office/drawing/2014/main" id="{A5BC813E-AA22-4E4D-942A-535C61665E58}"/>
+              </a:ext>
+            </a:extLst>
+          </p:cNvPr>
+          <p:cNvSpPr txBox="1"/>
+          <p:nvPr/>
+        </p:nvSpPr>
+        <p:spPr>
+          <a:xfrm>
+            <a:off x="6053735" y="3438669"/>
+            <a:ext cx="1761067" cy="369332"/>
+          </a:xfrm>
+          <a:prstGeom prst="rect">
+            <a:avLst/>
+          </a:prstGeom>
+          <a:noFill/>
+        </p:spPr>
+        <p:txBody>
+          <a:bodyPr wrap="square" rtlCol="0">
+            <a:spAutoFit/>
+          </a:bodyPr>
+          <a:lstStyle/>
+          <a:p>
+            <a:pPr algn="ctr"/>
+            <a:r>
+              <a:rPr lang="en-US" b="1" dirty="0">
+                <a:hlinkClick r:id="rId8" tooltip="LinkedIn"/>
+              </a:rPr>
+              <a:t>LinkedIn</a:t>
+            </a:r>
+            <a:endParaRPr lang="en-US" b="1" dirty="0"/>
+          </a:p>
+        </p:txBody>
+      </p:sp>
+      <p:sp>
+        <p:nvSpPr>
+          <p:cNvPr id="9" name="TextBox 8">
+            <a:extLst>
+              <a:ext uri="{FF2B5EF4-FFF2-40B4-BE49-F238E27FC236}">
+                <a16:creationId xmlns:a16="http://schemas.microsoft.com/office/drawing/2014/main" id="{2E042AB0-4420-4C43-A293-F0617552058A}"/>
+              </a:ext>
+            </a:extLst>
+          </p:cNvPr>
+          <p:cNvSpPr txBox="1"/>
+          <p:nvPr/>
+        </p:nvSpPr>
+        <p:spPr>
+          <a:xfrm>
+            <a:off x="8568267" y="3429000"/>
+            <a:ext cx="1602244" cy="379001"/>
+          </a:xfrm>
+          <a:prstGeom prst="rect">
+            <a:avLst/>
+          </a:prstGeom>
+          <a:noFill/>
+        </p:spPr>
+        <p:txBody>
+          <a:bodyPr wrap="square" rtlCol="0">
+            <a:spAutoFit/>
+          </a:bodyPr>
+          <a:lstStyle/>
+          <a:p>
+            <a:pPr algn="ctr"/>
+            <a:r>
+              <a:rPr lang="en-US" b="1" dirty="0">
+                <a:hlinkClick r:id="rId6" tooltip="Contact Me"/>
+              </a:rPr>
+              <a:t>Contact</a:t>
+            </a:r>
+            <a:endParaRPr lang="en-US" b="1" dirty="0"/>
           </a:p>
         </p:txBody>
       </p:sp>

</xml_diff>